<commit_message>
Update Roasted Assesment Presentation.pptx
</commit_message>
<xml_diff>
--- a/Roasted Assesment Presentation.pptx
+++ b/Roasted Assesment Presentation.pptx
@@ -122,6 +122,71 @@
 </p:presentation>
 </file>
 
+<file path=ppt/revisionInfo.xml><?xml version="1.0" encoding="utf-8"?>
+<p1510:revInfo xmlns:a="http://schemas.openxmlformats.org/drawingml/2006/main" xmlns:r="http://schemas.openxmlformats.org/officeDocument/2006/relationships" xmlns:p1510="http://schemas.microsoft.com/office/powerpoint/2015/10/main">
+  <p1510:revLst>
+    <p1510:client id="{FC6C50BD-2BB7-4A11-8CC3-8D9C5308CCAB}" v="2" dt="2020-10-23T13:20:50.351"/>
+  </p1510:revLst>
+</p1510:revInfo>
+</file>
+
+<file path=ppt/changesInfos/changesInfo1.xml><?xml version="1.0" encoding="utf-8"?>
+<pc:chgInfo xmlns:a="http://schemas.openxmlformats.org/drawingml/2006/main" xmlns:r="http://schemas.openxmlformats.org/officeDocument/2006/relationships" xmlns:ac="http://schemas.microsoft.com/office/drawing/2013/main/command" xmlns:pc="http://schemas.microsoft.com/office/powerpoint/2013/main/command">
+  <pc:docChgLst>
+    <pc:chgData name="Henry Fallows" userId="8a266a78faa61312" providerId="LiveId" clId="{FC6C50BD-2BB7-4A11-8CC3-8D9C5308CCAB}"/>
+    <pc:docChg chg="addSld delSld modSld">
+      <pc:chgData name="Henry Fallows" userId="8a266a78faa61312" providerId="LiveId" clId="{FC6C50BD-2BB7-4A11-8CC3-8D9C5308CCAB}" dt="2020-10-23T13:30:07.699" v="8" actId="47"/>
+      <pc:docMkLst>
+        <pc:docMk/>
+      </pc:docMkLst>
+      <pc:sldChg chg="modSp">
+        <pc:chgData name="Henry Fallows" userId="8a266a78faa61312" providerId="LiveId" clId="{FC6C50BD-2BB7-4A11-8CC3-8D9C5308CCAB}" dt="2020-10-23T13:20:47.210" v="0" actId="15"/>
+        <pc:sldMkLst>
+          <pc:docMk/>
+          <pc:sldMk cId="2689089790" sldId="258"/>
+        </pc:sldMkLst>
+        <pc:spChg chg="mod">
+          <ac:chgData name="Henry Fallows" userId="8a266a78faa61312" providerId="LiveId" clId="{FC6C50BD-2BB7-4A11-8CC3-8D9C5308CCAB}" dt="2020-10-23T13:20:47.210" v="0" actId="15"/>
+          <ac:spMkLst>
+            <pc:docMk/>
+            <pc:sldMk cId="2689089790" sldId="258"/>
+            <ac:spMk id="5" creationId="{1DC45D9A-0394-4359-BD65-444ACB460747}"/>
+          </ac:spMkLst>
+        </pc:spChg>
+      </pc:sldChg>
+      <pc:sldChg chg="new del">
+        <pc:chgData name="Henry Fallows" userId="8a266a78faa61312" providerId="LiveId" clId="{FC6C50BD-2BB7-4A11-8CC3-8D9C5308CCAB}" dt="2020-10-23T13:30:07.699" v="8" actId="47"/>
+        <pc:sldMkLst>
+          <pc:docMk/>
+          <pc:sldMk cId="1079510674" sldId="266"/>
+        </pc:sldMkLst>
+      </pc:sldChg>
+      <pc:sldChg chg="new del">
+        <pc:chgData name="Henry Fallows" userId="8a266a78faa61312" providerId="LiveId" clId="{FC6C50BD-2BB7-4A11-8CC3-8D9C5308CCAB}" dt="2020-10-23T13:30:06.329" v="7" actId="47"/>
+        <pc:sldMkLst>
+          <pc:docMk/>
+          <pc:sldMk cId="1598088561" sldId="267"/>
+        </pc:sldMkLst>
+      </pc:sldChg>
+      <pc:sldChg chg="new del">
+        <pc:chgData name="Henry Fallows" userId="8a266a78faa61312" providerId="LiveId" clId="{FC6C50BD-2BB7-4A11-8CC3-8D9C5308CCAB}" dt="2020-10-23T13:30:04.643" v="6" actId="47"/>
+        <pc:sldMkLst>
+          <pc:docMk/>
+          <pc:sldMk cId="1850467816" sldId="268"/>
+        </pc:sldMkLst>
+      </pc:sldChg>
+      <pc:sldChg chg="new del">
+        <pc:chgData name="Henry Fallows" userId="8a266a78faa61312" providerId="LiveId" clId="{FC6C50BD-2BB7-4A11-8CC3-8D9C5308CCAB}" dt="2020-10-23T13:30:02.736" v="5" actId="47"/>
+        <pc:sldMkLst>
+          <pc:docMk/>
+          <pc:sldMk cId="926011937" sldId="269"/>
+        </pc:sldMkLst>
+      </pc:sldChg>
+    </pc:docChg>
+  </pc:docChgLst>
+</pc:chgInfo>
+</file>
+
 <file path=ppt/notesMasters/notesMaster1.xml><?xml version="1.0" encoding="utf-8"?>
 <p:notesMaster xmlns:a="http://schemas.openxmlformats.org/drawingml/2006/main" xmlns:r="http://schemas.openxmlformats.org/officeDocument/2006/relationships" xmlns:p="http://schemas.openxmlformats.org/presentationml/2006/main">
   <p:cSld>
@@ -204,7 +269,7 @@
           <a:p>
             <a:fld id="{A14FA4E0-1A07-4F79-AEEE-089CCBFE14BC}" type="datetimeFigureOut">
               <a:rPr lang="en-GB" smtClean="0"/>
-              <a:t>22/10/2020</a:t>
+              <a:t>23/10/2020</a:t>
             </a:fld>
             <a:endParaRPr lang="en-GB"/>
           </a:p>
@@ -3223,7 +3288,7 @@
           <a:p>
             <a:fld id="{88D38747-4367-4BD2-8D51-C97E202738E2}" type="datetime1">
               <a:rPr lang="en-US" smtClean="0"/>
-              <a:t>10/22/2020</a:t>
+              <a:t>10/23/2020</a:t>
             </a:fld>
             <a:endParaRPr lang="en-US" dirty="0"/>
           </a:p>
@@ -3528,7 +3593,7 @@
           <a:p>
             <a:fld id="{11F1B079-7EF0-44EE-B798-BCC497C9F3B2}" type="datetime1">
               <a:rPr lang="en-US" smtClean="0"/>
-              <a:t>10/22/2020</a:t>
+              <a:t>10/23/2020</a:t>
             </a:fld>
             <a:endParaRPr lang="en-US" dirty="0"/>
           </a:p>
@@ -3722,7 +3787,7 @@
           <a:p>
             <a:fld id="{28FF70A8-1D13-4657-95F0-A9EA54967B8D}" type="datetime1">
               <a:rPr lang="en-US" smtClean="0"/>
-              <a:t>10/22/2020</a:t>
+              <a:t>10/23/2020</a:t>
             </a:fld>
             <a:endParaRPr lang="en-US" dirty="0"/>
           </a:p>
@@ -3985,7 +4050,7 @@
           <a:p>
             <a:fld id="{21EB90AC-71BD-4C7F-8ACA-7B3F18292E63}" type="datetime1">
               <a:rPr lang="en-US" smtClean="0"/>
-              <a:t>10/22/2020</a:t>
+              <a:t>10/23/2020</a:t>
             </a:fld>
             <a:endParaRPr lang="en-US" dirty="0"/>
           </a:p>
@@ -4421,7 +4486,7 @@
           <a:p>
             <a:fld id="{4E6EFC2C-8905-46F0-B443-CE905B76BA01}" type="datetime1">
               <a:rPr lang="en-US" smtClean="0"/>
-              <a:t>10/22/2020</a:t>
+              <a:t>10/23/2020</a:t>
             </a:fld>
             <a:endParaRPr lang="en-US" dirty="0"/>
           </a:p>
@@ -4958,7 +5023,7 @@
           <a:p>
             <a:fld id="{D9079DC3-C9B5-499E-9140-0DC28B7074E2}" type="datetime1">
               <a:rPr lang="en-US" smtClean="0"/>
-              <a:t>10/22/2020</a:t>
+              <a:t>10/23/2020</a:t>
             </a:fld>
             <a:endParaRPr lang="en-US" dirty="0"/>
           </a:p>
@@ -5840,7 +5905,7 @@
           <a:p>
             <a:fld id="{30BB33EA-E472-4D22-9C03-A9C14AA21CED}" type="datetime1">
               <a:rPr lang="en-US" smtClean="0"/>
-              <a:t>10/22/2020</a:t>
+              <a:t>10/23/2020</a:t>
             </a:fld>
             <a:endParaRPr lang="en-US" dirty="0"/>
           </a:p>
@@ -6010,7 +6075,7 @@
           <a:p>
             <a:fld id="{217E833E-1B6D-415F-AD29-75AE8C43BD0D}" type="datetime1">
               <a:rPr lang="en-US" smtClean="0"/>
-              <a:t>10/22/2020</a:t>
+              <a:t>10/23/2020</a:t>
             </a:fld>
             <a:endParaRPr lang="en-US" dirty="0"/>
           </a:p>
@@ -6194,7 +6259,7 @@
           <a:p>
             <a:fld id="{8452596F-08A7-4B70-989A-F2B1CF31E66B}" type="datetime1">
               <a:rPr lang="en-US" smtClean="0"/>
-              <a:t>10/22/2020</a:t>
+              <a:t>10/23/2020</a:t>
             </a:fld>
             <a:endParaRPr lang="en-US" dirty="0"/>
           </a:p>
@@ -6364,7 +6429,7 @@
           <a:p>
             <a:fld id="{73C55A3C-5767-4844-A0A3-83778C2E5409}" type="datetime1">
               <a:rPr lang="en-US" smtClean="0"/>
-              <a:t>10/22/2020</a:t>
+              <a:t>10/23/2020</a:t>
             </a:fld>
             <a:endParaRPr lang="en-US" dirty="0"/>
           </a:p>
@@ -6608,7 +6673,7 @@
           <a:p>
             <a:fld id="{CAE507A8-A5CF-4D38-AB86-7EDDA87A85D4}" type="datetime1">
               <a:rPr lang="en-US" smtClean="0"/>
-              <a:t>10/22/2020</a:t>
+              <a:t>10/23/2020</a:t>
             </a:fld>
             <a:endParaRPr lang="en-US" dirty="0"/>
           </a:p>
@@ -6850,7 +6915,7 @@
           <a:p>
             <a:fld id="{BDFCD27C-8599-43EF-BA1D-14DDC1946E06}" type="datetime1">
               <a:rPr lang="en-US" smtClean="0"/>
-              <a:t>10/22/2020</a:t>
+              <a:t>10/23/2020</a:t>
             </a:fld>
             <a:endParaRPr lang="en-US" dirty="0"/>
           </a:p>
@@ -7333,7 +7398,7 @@
           <a:p>
             <a:fld id="{49343D99-809A-49C0-96E5-4250D0B498EE}" type="datetime1">
               <a:rPr lang="en-US" smtClean="0"/>
-              <a:t>10/22/2020</a:t>
+              <a:t>10/23/2020</a:t>
             </a:fld>
             <a:endParaRPr lang="en-US" dirty="0"/>
           </a:p>
@@ -7451,7 +7516,7 @@
           <a:p>
             <a:fld id="{A143DE9B-B678-4EFB-BB7D-A4370204A0B0}" type="datetime1">
               <a:rPr lang="en-US" smtClean="0"/>
-              <a:t>10/22/2020</a:t>
+              <a:t>10/23/2020</a:t>
             </a:fld>
             <a:endParaRPr lang="en-US" dirty="0"/>
           </a:p>
@@ -7546,7 +7611,7 @@
           <a:p>
             <a:fld id="{E68812DA-F765-4142-A6A3-A8ED7235E082}" type="datetime1">
               <a:rPr lang="en-US" smtClean="0"/>
-              <a:t>10/22/2020</a:t>
+              <a:t>10/23/2020</a:t>
             </a:fld>
             <a:endParaRPr lang="en-US" dirty="0"/>
           </a:p>
@@ -7801,7 +7866,7 @@
           <a:p>
             <a:fld id="{3E0277FD-7DE6-41D4-930D-AC99F5AFE54E}" type="datetime1">
               <a:rPr lang="en-US" smtClean="0"/>
-              <a:t>10/22/2020</a:t>
+              <a:t>10/23/2020</a:t>
             </a:fld>
             <a:endParaRPr lang="en-US" dirty="0"/>
           </a:p>
@@ -8108,7 +8173,7 @@
           <a:p>
             <a:fld id="{9EA15526-7079-4B7B-987C-1B5FAE11A0FF}" type="datetime1">
               <a:rPr lang="en-US" smtClean="0"/>
-              <a:t>10/22/2020</a:t>
+              <a:t>10/23/2020</a:t>
             </a:fld>
             <a:endParaRPr lang="en-US" dirty="0"/>
           </a:p>
@@ -8343,7 +8408,7 @@
           <a:p>
             <a:fld id="{073ED0CC-082F-4160-86E5-0D6041F12778}" type="datetime1">
               <a:rPr lang="en-US" smtClean="0"/>
-              <a:t>10/22/2020</a:t>
+              <a:t>10/23/2020</a:t>
             </a:fld>
             <a:endParaRPr lang="en-US" dirty="0"/>
           </a:p>
@@ -9148,13 +9213,13 @@
   <p:clrMapOvr>
     <a:masterClrMapping/>
   </p:clrMapOvr>
-  <mc:AlternateContent xmlns:mc="http://schemas.openxmlformats.org/markup-compatibility/2006">
-    <mc:Choice xmlns:p159="http://schemas.microsoft.com/office/powerpoint/2015/09/main" Requires="p159">
+  <mc:AlternateContent xmlns:mc="http://schemas.openxmlformats.org/markup-compatibility/2006" xmlns:p159="http://schemas.microsoft.com/office/powerpoint/2015/09/main">
+    <mc:Choice Requires="p159">
       <p:transition xmlns:p14="http://schemas.microsoft.com/office/powerpoint/2010/main" spd="slow" p14:dur="2000">
         <p159:morph option="byObject"/>
       </p:transition>
     </mc:Choice>
-    <mc:Fallback>
+    <mc:Fallback xmlns="">
       <p:transition spd="slow">
         <p:fade/>
       </p:transition>

</xml_diff>